<commit_message>
added presentation as well as some sample pictures, and some changes to readme - additional links
</commit_message>
<xml_diff>
--- a/presentations/praesentation1.pptx
+++ b/presentations/praesentation1.pptx
@@ -4,9 +4,14 @@
   <p:sldMasterIdLst>
     <p:sldMasterId id="2147483648" r:id="rId1"/>
   </p:sldMasterIdLst>
+  <p:notesMasterIdLst>
+    <p:notesMasterId r:id="rId6"/>
+  </p:notesMasterIdLst>
   <p:sldIdLst>
-    <p:sldId id="256" r:id="rId2"/>
-    <p:sldId id="257" r:id="rId3"/>
+    <p:sldId id="257" r:id="rId2"/>
+    <p:sldId id="256" r:id="rId3"/>
+    <p:sldId id="258" r:id="rId4"/>
+    <p:sldId id="259" r:id="rId5"/>
   </p:sldIdLst>
   <p:sldSz cx="12192000" cy="6858000"/>
   <p:notesSz cx="6858000" cy="9144000"/>
@@ -105,7 +110,669 @@
       </a:defRPr>
     </a:lvl9pPr>
   </p:defaultTextStyle>
+  <p:extLst>
+    <p:ext uri="{EFAFB233-063F-42B5-8137-9DF3F51BA10A}">
+      <p15:sldGuideLst xmlns:p15="http://schemas.microsoft.com/office/powerpoint/2012/main"/>
+    </p:ext>
+  </p:extLst>
 </p:presentation>
+</file>
+
+<file path=ppt/notesMasters/notesMaster1.xml><?xml version="1.0" encoding="utf-8"?>
+<p:notesMaster xmlns:a="http://schemas.openxmlformats.org/drawingml/2006/main" xmlns:r="http://schemas.openxmlformats.org/officeDocument/2006/relationships" xmlns:p="http://schemas.openxmlformats.org/presentationml/2006/main">
+  <p:cSld>
+    <p:bg>
+      <p:bgRef idx="1001">
+        <a:schemeClr val="bg1"/>
+      </p:bgRef>
+    </p:bg>
+    <p:spTree>
+      <p:nvGrpSpPr>
+        <p:cNvPr id="1" name=""/>
+        <p:cNvGrpSpPr/>
+        <p:nvPr/>
+      </p:nvGrpSpPr>
+      <p:grpSpPr>
+        <a:xfrm>
+          <a:off x="0" y="0"/>
+          <a:ext cx="0" cy="0"/>
+          <a:chOff x="0" y="0"/>
+          <a:chExt cx="0" cy="0"/>
+        </a:xfrm>
+      </p:grpSpPr>
+      <p:sp>
+        <p:nvSpPr>
+          <p:cNvPr id="2" name="Kopfzeilenplatzhalter 1"/>
+          <p:cNvSpPr>
+            <a:spLocks noGrp="1"/>
+          </p:cNvSpPr>
+          <p:nvPr>
+            <p:ph type="hdr" sz="quarter"/>
+          </p:nvPr>
+        </p:nvSpPr>
+        <p:spPr>
+          <a:xfrm>
+            <a:off x="0" y="0"/>
+            <a:ext cx="2971800" cy="458788"/>
+          </a:xfrm>
+          <a:prstGeom prst="rect">
+            <a:avLst/>
+          </a:prstGeom>
+        </p:spPr>
+        <p:txBody>
+          <a:bodyPr vert="horz" lIns="91440" tIns="45720" rIns="91440" bIns="45720" rtlCol="0"/>
+          <a:lstStyle>
+            <a:lvl1pPr algn="l">
+              <a:defRPr sz="1200"/>
+            </a:lvl1pPr>
+          </a:lstStyle>
+          <a:p>
+            <a:endParaRPr lang="en-DE"/>
+          </a:p>
+        </p:txBody>
+      </p:sp>
+      <p:sp>
+        <p:nvSpPr>
+          <p:cNvPr id="3" name="Datumsplatzhalter 2"/>
+          <p:cNvSpPr>
+            <a:spLocks noGrp="1"/>
+          </p:cNvSpPr>
+          <p:nvPr>
+            <p:ph type="dt" idx="1"/>
+          </p:nvPr>
+        </p:nvSpPr>
+        <p:spPr>
+          <a:xfrm>
+            <a:off x="3884613" y="0"/>
+            <a:ext cx="2971800" cy="458788"/>
+          </a:xfrm>
+          <a:prstGeom prst="rect">
+            <a:avLst/>
+          </a:prstGeom>
+        </p:spPr>
+        <p:txBody>
+          <a:bodyPr vert="horz" lIns="91440" tIns="45720" rIns="91440" bIns="45720" rtlCol="0"/>
+          <a:lstStyle>
+            <a:lvl1pPr algn="r">
+              <a:defRPr sz="1200"/>
+            </a:lvl1pPr>
+          </a:lstStyle>
+          <a:p>
+            <a:fld id="{EACE4B10-EE05-4870-BE97-2882C1CC2150}" type="datetimeFigureOut">
+              <a:rPr lang="en-DE" smtClean="0"/>
+              <a:t>12/04/2021</a:t>
+            </a:fld>
+            <a:endParaRPr lang="en-DE"/>
+          </a:p>
+        </p:txBody>
+      </p:sp>
+      <p:sp>
+        <p:nvSpPr>
+          <p:cNvPr id="4" name="Folienbildplatzhalter 3"/>
+          <p:cNvSpPr>
+            <a:spLocks noGrp="1" noRot="1" noChangeAspect="1"/>
+          </p:cNvSpPr>
+          <p:nvPr>
+            <p:ph type="sldImg" idx="2"/>
+          </p:nvPr>
+        </p:nvSpPr>
+        <p:spPr>
+          <a:xfrm>
+            <a:off x="685800" y="1143000"/>
+            <a:ext cx="5486400" cy="3086100"/>
+          </a:xfrm>
+          <a:prstGeom prst="rect">
+            <a:avLst/>
+          </a:prstGeom>
+          <a:noFill/>
+          <a:ln w="12700">
+            <a:solidFill>
+              <a:prstClr val="black"/>
+            </a:solidFill>
+          </a:ln>
+        </p:spPr>
+        <p:txBody>
+          <a:bodyPr vert="horz" lIns="91440" tIns="45720" rIns="91440" bIns="45720" rtlCol="0" anchor="ctr"/>
+          <a:lstStyle/>
+          <a:p>
+            <a:endParaRPr lang="en-DE"/>
+          </a:p>
+        </p:txBody>
+      </p:sp>
+      <p:sp>
+        <p:nvSpPr>
+          <p:cNvPr id="5" name="Notizenplatzhalter 4"/>
+          <p:cNvSpPr>
+            <a:spLocks noGrp="1"/>
+          </p:cNvSpPr>
+          <p:nvPr>
+            <p:ph type="body" sz="quarter" idx="3"/>
+          </p:nvPr>
+        </p:nvSpPr>
+        <p:spPr>
+          <a:xfrm>
+            <a:off x="685800" y="4400550"/>
+            <a:ext cx="5486400" cy="3600450"/>
+          </a:xfrm>
+          <a:prstGeom prst="rect">
+            <a:avLst/>
+          </a:prstGeom>
+        </p:spPr>
+        <p:txBody>
+          <a:bodyPr vert="horz" lIns="91440" tIns="45720" rIns="91440" bIns="45720" rtlCol="0"/>
+          <a:lstStyle/>
+          <a:p>
+            <a:pPr lvl="0"/>
+            <a:r>
+              <a:rPr lang="de-DE"/>
+              <a:t>Mastertextformat bearbeiten</a:t>
+            </a:r>
+          </a:p>
+          <a:p>
+            <a:pPr lvl="1"/>
+            <a:r>
+              <a:rPr lang="de-DE"/>
+              <a:t>Zweite Ebene</a:t>
+            </a:r>
+          </a:p>
+          <a:p>
+            <a:pPr lvl="2"/>
+            <a:r>
+              <a:rPr lang="de-DE"/>
+              <a:t>Dritte Ebene</a:t>
+            </a:r>
+          </a:p>
+          <a:p>
+            <a:pPr lvl="3"/>
+            <a:r>
+              <a:rPr lang="de-DE"/>
+              <a:t>Vierte Ebene</a:t>
+            </a:r>
+          </a:p>
+          <a:p>
+            <a:pPr lvl="4"/>
+            <a:r>
+              <a:rPr lang="de-DE"/>
+              <a:t>Fünfte Ebene</a:t>
+            </a:r>
+            <a:endParaRPr lang="en-DE"/>
+          </a:p>
+        </p:txBody>
+      </p:sp>
+      <p:sp>
+        <p:nvSpPr>
+          <p:cNvPr id="6" name="Fußzeilenplatzhalter 5"/>
+          <p:cNvSpPr>
+            <a:spLocks noGrp="1"/>
+          </p:cNvSpPr>
+          <p:nvPr>
+            <p:ph type="ftr" sz="quarter" idx="4"/>
+          </p:nvPr>
+        </p:nvSpPr>
+        <p:spPr>
+          <a:xfrm>
+            <a:off x="0" y="8685213"/>
+            <a:ext cx="2971800" cy="458787"/>
+          </a:xfrm>
+          <a:prstGeom prst="rect">
+            <a:avLst/>
+          </a:prstGeom>
+        </p:spPr>
+        <p:txBody>
+          <a:bodyPr vert="horz" lIns="91440" tIns="45720" rIns="91440" bIns="45720" rtlCol="0" anchor="b"/>
+          <a:lstStyle>
+            <a:lvl1pPr algn="l">
+              <a:defRPr sz="1200"/>
+            </a:lvl1pPr>
+          </a:lstStyle>
+          <a:p>
+            <a:endParaRPr lang="en-DE"/>
+          </a:p>
+        </p:txBody>
+      </p:sp>
+      <p:sp>
+        <p:nvSpPr>
+          <p:cNvPr id="7" name="Foliennummernplatzhalter 6"/>
+          <p:cNvSpPr>
+            <a:spLocks noGrp="1"/>
+          </p:cNvSpPr>
+          <p:nvPr>
+            <p:ph type="sldNum" sz="quarter" idx="5"/>
+          </p:nvPr>
+        </p:nvSpPr>
+        <p:spPr>
+          <a:xfrm>
+            <a:off x="3884613" y="8685213"/>
+            <a:ext cx="2971800" cy="458787"/>
+          </a:xfrm>
+          <a:prstGeom prst="rect">
+            <a:avLst/>
+          </a:prstGeom>
+        </p:spPr>
+        <p:txBody>
+          <a:bodyPr vert="horz" lIns="91440" tIns="45720" rIns="91440" bIns="45720" rtlCol="0" anchor="b"/>
+          <a:lstStyle>
+            <a:lvl1pPr algn="r">
+              <a:defRPr sz="1200"/>
+            </a:lvl1pPr>
+          </a:lstStyle>
+          <a:p>
+            <a:fld id="{26863EFA-AE46-467D-BABF-340B81165C40}" type="slidenum">
+              <a:rPr lang="en-DE" smtClean="0"/>
+              <a:t>‹Nr.›</a:t>
+            </a:fld>
+            <a:endParaRPr lang="en-DE"/>
+          </a:p>
+        </p:txBody>
+      </p:sp>
+    </p:spTree>
+    <p:extLst>
+      <p:ext uri="{BB962C8B-B14F-4D97-AF65-F5344CB8AC3E}">
+        <p14:creationId xmlns:p14="http://schemas.microsoft.com/office/powerpoint/2010/main" val="4077869078"/>
+      </p:ext>
+    </p:extLst>
+  </p:cSld>
+  <p:clrMap bg1="lt1" tx1="dk1" bg2="lt2" tx2="dk2" accent1="accent1" accent2="accent2" accent3="accent3" accent4="accent4" accent5="accent5" accent6="accent6" hlink="hlink" folHlink="folHlink"/>
+  <p:notesStyle>
+    <a:lvl1pPr marL="0" algn="l" defTabSz="914400" rtl="0" eaLnBrk="1" latinLnBrk="0" hangingPunct="1">
+      <a:defRPr sz="1200" kern="1200">
+        <a:solidFill>
+          <a:schemeClr val="tx1"/>
+        </a:solidFill>
+        <a:latin typeface="+mn-lt"/>
+        <a:ea typeface="+mn-ea"/>
+        <a:cs typeface="+mn-cs"/>
+      </a:defRPr>
+    </a:lvl1pPr>
+    <a:lvl2pPr marL="457200" algn="l" defTabSz="914400" rtl="0" eaLnBrk="1" latinLnBrk="0" hangingPunct="1">
+      <a:defRPr sz="1200" kern="1200">
+        <a:solidFill>
+          <a:schemeClr val="tx1"/>
+        </a:solidFill>
+        <a:latin typeface="+mn-lt"/>
+        <a:ea typeface="+mn-ea"/>
+        <a:cs typeface="+mn-cs"/>
+      </a:defRPr>
+    </a:lvl2pPr>
+    <a:lvl3pPr marL="914400" algn="l" defTabSz="914400" rtl="0" eaLnBrk="1" latinLnBrk="0" hangingPunct="1">
+      <a:defRPr sz="1200" kern="1200">
+        <a:solidFill>
+          <a:schemeClr val="tx1"/>
+        </a:solidFill>
+        <a:latin typeface="+mn-lt"/>
+        <a:ea typeface="+mn-ea"/>
+        <a:cs typeface="+mn-cs"/>
+      </a:defRPr>
+    </a:lvl3pPr>
+    <a:lvl4pPr marL="1371600" algn="l" defTabSz="914400" rtl="0" eaLnBrk="1" latinLnBrk="0" hangingPunct="1">
+      <a:defRPr sz="1200" kern="1200">
+        <a:solidFill>
+          <a:schemeClr val="tx1"/>
+        </a:solidFill>
+        <a:latin typeface="+mn-lt"/>
+        <a:ea typeface="+mn-ea"/>
+        <a:cs typeface="+mn-cs"/>
+      </a:defRPr>
+    </a:lvl4pPr>
+    <a:lvl5pPr marL="1828800" algn="l" defTabSz="914400" rtl="0" eaLnBrk="1" latinLnBrk="0" hangingPunct="1">
+      <a:defRPr sz="1200" kern="1200">
+        <a:solidFill>
+          <a:schemeClr val="tx1"/>
+        </a:solidFill>
+        <a:latin typeface="+mn-lt"/>
+        <a:ea typeface="+mn-ea"/>
+        <a:cs typeface="+mn-cs"/>
+      </a:defRPr>
+    </a:lvl5pPr>
+    <a:lvl6pPr marL="2286000" algn="l" defTabSz="914400" rtl="0" eaLnBrk="1" latinLnBrk="0" hangingPunct="1">
+      <a:defRPr sz="1200" kern="1200">
+        <a:solidFill>
+          <a:schemeClr val="tx1"/>
+        </a:solidFill>
+        <a:latin typeface="+mn-lt"/>
+        <a:ea typeface="+mn-ea"/>
+        <a:cs typeface="+mn-cs"/>
+      </a:defRPr>
+    </a:lvl6pPr>
+    <a:lvl7pPr marL="2743200" algn="l" defTabSz="914400" rtl="0" eaLnBrk="1" latinLnBrk="0" hangingPunct="1">
+      <a:defRPr sz="1200" kern="1200">
+        <a:solidFill>
+          <a:schemeClr val="tx1"/>
+        </a:solidFill>
+        <a:latin typeface="+mn-lt"/>
+        <a:ea typeface="+mn-ea"/>
+        <a:cs typeface="+mn-cs"/>
+      </a:defRPr>
+    </a:lvl7pPr>
+    <a:lvl8pPr marL="3200400" algn="l" defTabSz="914400" rtl="0" eaLnBrk="1" latinLnBrk="0" hangingPunct="1">
+      <a:defRPr sz="1200" kern="1200">
+        <a:solidFill>
+          <a:schemeClr val="tx1"/>
+        </a:solidFill>
+        <a:latin typeface="+mn-lt"/>
+        <a:ea typeface="+mn-ea"/>
+        <a:cs typeface="+mn-cs"/>
+      </a:defRPr>
+    </a:lvl8pPr>
+    <a:lvl9pPr marL="3657600" algn="l" defTabSz="914400" rtl="0" eaLnBrk="1" latinLnBrk="0" hangingPunct="1">
+      <a:defRPr sz="1200" kern="1200">
+        <a:solidFill>
+          <a:schemeClr val="tx1"/>
+        </a:solidFill>
+        <a:latin typeface="+mn-lt"/>
+        <a:ea typeface="+mn-ea"/>
+        <a:cs typeface="+mn-cs"/>
+      </a:defRPr>
+    </a:lvl9pPr>
+  </p:notesStyle>
+</p:notesMaster>
+</file>
+
+<file path=ppt/notesSlides/notesSlide1.xml><?xml version="1.0" encoding="utf-8"?>
+<p:notes xmlns:a="http://schemas.openxmlformats.org/drawingml/2006/main" xmlns:r="http://schemas.openxmlformats.org/officeDocument/2006/relationships" xmlns:p="http://schemas.openxmlformats.org/presentationml/2006/main">
+  <p:cSld>
+    <p:spTree>
+      <p:nvGrpSpPr>
+        <p:cNvPr id="1" name=""/>
+        <p:cNvGrpSpPr/>
+        <p:nvPr/>
+      </p:nvGrpSpPr>
+      <p:grpSpPr>
+        <a:xfrm>
+          <a:off x="0" y="0"/>
+          <a:ext cx="0" cy="0"/>
+          <a:chOff x="0" y="0"/>
+          <a:chExt cx="0" cy="0"/>
+        </a:xfrm>
+      </p:grpSpPr>
+      <p:sp>
+        <p:nvSpPr>
+          <p:cNvPr id="2" name="Folienbildplatzhalter 1"/>
+          <p:cNvSpPr>
+            <a:spLocks noGrp="1" noRot="1" noChangeAspect="1"/>
+          </p:cNvSpPr>
+          <p:nvPr>
+            <p:ph type="sldImg"/>
+          </p:nvPr>
+        </p:nvSpPr>
+        <p:spPr/>
+      </p:sp>
+      <p:sp>
+        <p:nvSpPr>
+          <p:cNvPr id="3" name="Notizenplatzhalter 2"/>
+          <p:cNvSpPr>
+            <a:spLocks noGrp="1"/>
+          </p:cNvSpPr>
+          <p:nvPr>
+            <p:ph type="body" idx="1"/>
+          </p:nvPr>
+        </p:nvSpPr>
+        <p:spPr/>
+        <p:txBody>
+          <a:bodyPr/>
+          <a:lstStyle/>
+          <a:p>
+            <a:r>
+              <a:rPr lang="en-US" dirty="0" err="1"/>
+              <a:t>Kalibrierung</a:t>
+            </a:r>
+            <a:r>
+              <a:rPr lang="en-US" dirty="0"/>
+              <a:t> um distortion </a:t>
+            </a:r>
+            <a:r>
+              <a:rPr lang="en-US" dirty="0" err="1"/>
+              <a:t>aufzuheben</a:t>
+            </a:r>
+            <a:r>
+              <a:rPr lang="en-US" dirty="0"/>
+              <a:t> (</a:t>
+            </a:r>
+            <a:r>
+              <a:rPr lang="en-US" dirty="0" err="1"/>
+              <a:t>Verzerrungen</a:t>
+            </a:r>
+            <a:r>
+              <a:rPr lang="en-US" dirty="0"/>
+              <a:t> </a:t>
+            </a:r>
+            <a:r>
+              <a:rPr lang="en-US" dirty="0" err="1"/>
+              <a:t>aufzuheben</a:t>
+            </a:r>
+            <a:r>
+              <a:rPr lang="en-US" dirty="0"/>
+              <a:t>)</a:t>
+            </a:r>
+          </a:p>
+          <a:p>
+            <a:endParaRPr lang="en-US" dirty="0"/>
+          </a:p>
+          <a:p>
+            <a:endParaRPr lang="en-US" dirty="0"/>
+          </a:p>
+          <a:p>
+            <a:endParaRPr lang="en-US" dirty="0"/>
+          </a:p>
+          <a:p>
+            <a:r>
+              <a:rPr lang="en-US" dirty="0"/>
+              <a:t>Rectification </a:t>
+            </a:r>
+            <a:r>
+              <a:rPr lang="en-US" dirty="0" err="1"/>
+              <a:t>ist</a:t>
+            </a:r>
+            <a:r>
+              <a:rPr lang="en-US" dirty="0"/>
+              <a:t> </a:t>
+            </a:r>
+            <a:r>
+              <a:rPr lang="en-US" dirty="0" err="1"/>
+              <a:t>noetig</a:t>
+            </a:r>
+            <a:r>
+              <a:rPr lang="en-US" dirty="0"/>
+              <a:t> um die </a:t>
+            </a:r>
+            <a:r>
+              <a:rPr lang="en-US" dirty="0" err="1"/>
+              <a:t>Bilder</a:t>
+            </a:r>
+            <a:r>
+              <a:rPr lang="en-US" dirty="0"/>
+              <a:t> </a:t>
+            </a:r>
+            <a:r>
+              <a:rPr lang="en-US" dirty="0" err="1"/>
+              <a:t>zu</a:t>
+            </a:r>
+            <a:r>
+              <a:rPr lang="en-US" dirty="0"/>
+              <a:t> </a:t>
+            </a:r>
+            <a:r>
+              <a:rPr lang="en-US" dirty="0" err="1"/>
+              <a:t>syncen</a:t>
+            </a:r>
+            <a:r>
+              <a:rPr lang="en-US" dirty="0"/>
+              <a:t> </a:t>
+            </a:r>
+          </a:p>
+          <a:p>
+            <a:r>
+              <a:rPr lang="en-US" dirty="0" err="1"/>
+              <a:t>Angenommen</a:t>
+            </a:r>
+            <a:r>
+              <a:rPr lang="en-US" dirty="0"/>
+              <a:t> Matrix </a:t>
+            </a:r>
+            <a:r>
+              <a:rPr lang="en-US" dirty="0" err="1"/>
+              <a:t>aus</a:t>
+            </a:r>
+            <a:r>
+              <a:rPr lang="en-US" dirty="0"/>
+              <a:t> </a:t>
+            </a:r>
+            <a:r>
+              <a:rPr lang="en-US" dirty="0" err="1"/>
+              <a:t>rgb</a:t>
+            </a:r>
+            <a:r>
+              <a:rPr lang="en-US" dirty="0"/>
+              <a:t> </a:t>
+            </a:r>
+            <a:r>
+              <a:rPr lang="en-US" dirty="0" err="1"/>
+              <a:t>werten</a:t>
+            </a:r>
+            <a:r>
+              <a:rPr lang="en-US" dirty="0"/>
+              <a:t> das der y wert </a:t>
+            </a:r>
+            <a:r>
+              <a:rPr lang="en-US" dirty="0" err="1"/>
+              <a:t>uebereinstimmt</a:t>
+            </a:r>
+            <a:r>
+              <a:rPr lang="en-US" dirty="0"/>
+              <a:t> </a:t>
+            </a:r>
+            <a:r>
+              <a:rPr lang="en-US" dirty="0" err="1"/>
+              <a:t>als</a:t>
+            </a:r>
+            <a:r>
+              <a:rPr lang="en-US" dirty="0"/>
+              <a:t> das </a:t>
+            </a:r>
+            <a:r>
+              <a:rPr lang="en-US" dirty="0" err="1"/>
+              <a:t>bilder</a:t>
+            </a:r>
+            <a:r>
+              <a:rPr lang="en-US" dirty="0"/>
+              <a:t> pixel </a:t>
+            </a:r>
+            <a:r>
+              <a:rPr lang="en-US" dirty="0" err="1"/>
+              <a:t>genau</a:t>
+            </a:r>
+            <a:r>
+              <a:rPr lang="en-US" dirty="0"/>
+              <a:t> </a:t>
+            </a:r>
+            <a:r>
+              <a:rPr lang="en-US" dirty="0" err="1"/>
+              <a:t>uebereinander</a:t>
+            </a:r>
+            <a:r>
+              <a:rPr lang="en-US" dirty="0"/>
+              <a:t> </a:t>
+            </a:r>
+            <a:r>
+              <a:rPr lang="en-US" dirty="0" err="1"/>
+              <a:t>liegen</a:t>
+            </a:r>
+            <a:endParaRPr lang="en-US" dirty="0"/>
+          </a:p>
+          <a:p>
+            <a:endParaRPr lang="en-US" dirty="0"/>
+          </a:p>
+          <a:p>
+            <a:r>
+              <a:rPr lang="en-US" dirty="0"/>
+              <a:t> </a:t>
+            </a:r>
+            <a:r>
+              <a:rPr lang="en-US" dirty="0" err="1"/>
+              <a:t>Opencv</a:t>
+            </a:r>
+            <a:r>
+              <a:rPr lang="en-US" dirty="0"/>
+              <a:t> </a:t>
+            </a:r>
+            <a:r>
+              <a:rPr lang="en-US" dirty="0" err="1"/>
+              <a:t>kann</a:t>
+            </a:r>
+            <a:r>
+              <a:rPr lang="en-US" dirty="0"/>
+              <a:t> </a:t>
+            </a:r>
+            <a:r>
+              <a:rPr lang="en-US" dirty="0" err="1"/>
+              <a:t>diese</a:t>
+            </a:r>
+            <a:r>
+              <a:rPr lang="en-US" dirty="0"/>
+              <a:t> </a:t>
+            </a:r>
+            <a:r>
+              <a:rPr lang="en-US" dirty="0" err="1"/>
+              <a:t>kalibrierung</a:t>
+            </a:r>
+            <a:r>
+              <a:rPr lang="en-US" dirty="0"/>
+              <a:t> </a:t>
+            </a:r>
+            <a:r>
+              <a:rPr lang="en-US" dirty="0" err="1"/>
+              <a:t>bereits</a:t>
+            </a:r>
+            <a:r>
+              <a:rPr lang="en-US" dirty="0"/>
+              <a:t> </a:t>
+            </a:r>
+            <a:r>
+              <a:rPr lang="en-US" dirty="0" err="1"/>
+              <a:t>mit</a:t>
+            </a:r>
+            <a:r>
+              <a:rPr lang="en-US" dirty="0"/>
+              <a:t> stereo calibrate</a:t>
+            </a:r>
+            <a:endParaRPr lang="en-DE" dirty="0"/>
+          </a:p>
+        </p:txBody>
+      </p:sp>
+      <p:sp>
+        <p:nvSpPr>
+          <p:cNvPr id="4" name="Foliennummernplatzhalter 3"/>
+          <p:cNvSpPr>
+            <a:spLocks noGrp="1"/>
+          </p:cNvSpPr>
+          <p:nvPr>
+            <p:ph type="sldNum" sz="quarter" idx="5"/>
+          </p:nvPr>
+        </p:nvSpPr>
+        <p:spPr/>
+        <p:txBody>
+          <a:bodyPr/>
+          <a:lstStyle/>
+          <a:p>
+            <a:fld id="{26863EFA-AE46-467D-BABF-340B81165C40}" type="slidenum">
+              <a:rPr lang="en-DE" smtClean="0"/>
+              <a:t>1</a:t>
+            </a:fld>
+            <a:endParaRPr lang="en-DE"/>
+          </a:p>
+        </p:txBody>
+      </p:sp>
+    </p:spTree>
+    <p:extLst>
+      <p:ext uri="{BB962C8B-B14F-4D97-AF65-F5344CB8AC3E}">
+        <p14:creationId xmlns:p14="http://schemas.microsoft.com/office/powerpoint/2010/main" val="2802201824"/>
+      </p:ext>
+    </p:extLst>
+  </p:cSld>
+  <p:clrMapOvr>
+    <a:masterClrMapping/>
+  </p:clrMapOvr>
+</p:notes>
 </file>
 
 <file path=ppt/slideLayouts/slideLayout1.xml><?xml version="1.0" encoding="utf-8"?>
@@ -3343,64 +4010,12 @@
           <a:chExt cx="0" cy="0"/>
         </a:xfrm>
       </p:grpSpPr>
-      <p:sp>
-        <p:nvSpPr>
-          <p:cNvPr id="4" name="Titel 3">
-            <a:extLst>
-              <a:ext uri="{FF2B5EF4-FFF2-40B4-BE49-F238E27FC236}">
-                <a16:creationId xmlns:a16="http://schemas.microsoft.com/office/drawing/2014/main" id="{DF8571DC-9EE8-4F78-A0C8-9C1F3D6041BA}"/>
-              </a:ext>
-            </a:extLst>
-          </p:cNvPr>
-          <p:cNvSpPr>
-            <a:spLocks noGrp="1"/>
-          </p:cNvSpPr>
-          <p:nvPr>
-            <p:ph type="title"/>
-          </p:nvPr>
-        </p:nvSpPr>
-        <p:spPr>
-          <a:xfrm>
-            <a:off x="805543" y="3572311"/>
-            <a:ext cx="5214257" cy="420003"/>
-          </a:xfrm>
-        </p:spPr>
-        <p:txBody>
-          <a:bodyPr>
-            <a:normAutofit fontScale="90000"/>
-          </a:bodyPr>
-          <a:lstStyle/>
-          <a:p>
-            <a:pPr algn="ctr"/>
-            <a:r>
-              <a:rPr lang="en-US" sz="1200" dirty="0" err="1"/>
-              <a:t>Linkes</a:t>
-            </a:r>
-            <a:r>
-              <a:rPr lang="en-US" sz="1200" dirty="0"/>
-              <a:t> </a:t>
-            </a:r>
-            <a:r>
-              <a:rPr lang="en-US" sz="1200" dirty="0" err="1"/>
-              <a:t>Kamera</a:t>
-            </a:r>
-            <a:r>
-              <a:rPr lang="en-US" sz="1200" dirty="0"/>
-              <a:t> Bild</a:t>
-            </a:r>
-            <a:br>
-              <a:rPr lang="en-US" sz="1200" dirty="0"/>
-            </a:br>
-            <a:endParaRPr lang="en-DE" sz="1200" dirty="0"/>
-          </a:p>
-        </p:txBody>
-      </p:sp>
       <p:pic>
         <p:nvPicPr>
-          <p:cNvPr id="8" name="Inhaltsplatzhalter 7" descr="Ein Bild, das drinnen, Boden, schwarz, weiß enthält.&#10;&#10;Automatisch generierte Beschreibung">
-            <a:extLst>
-              <a:ext uri="{FF2B5EF4-FFF2-40B4-BE49-F238E27FC236}">
-                <a16:creationId xmlns:a16="http://schemas.microsoft.com/office/drawing/2014/main" id="{A5659F69-5508-4DC6-BEA6-E6CBA03BD2A3}"/>
+          <p:cNvPr id="9" name="Inhaltsplatzhalter 8" descr="Ein Bild, das Text, Anzeigetafel, Erste Hilfe-Kasten, Kreuzworträtsel enthält.&#10;&#10;Automatisch generierte Beschreibung">
+            <a:extLst>
+              <a:ext uri="{FF2B5EF4-FFF2-40B4-BE49-F238E27FC236}">
+                <a16:creationId xmlns:a16="http://schemas.microsoft.com/office/drawing/2014/main" id="{8549A7AD-D37D-40C5-A5E3-E0A295E7A9BF}"/>
               </a:ext>
             </a:extLst>
           </p:cNvPr>
@@ -3412,7 +4027,7 @@
           </p:nvPr>
         </p:nvPicPr>
         <p:blipFill>
-          <a:blip r:embed="rId2">
+          <a:blip r:embed="rId3">
             <a:extLst>
               <a:ext uri="{28A0092B-C50C-407E-A947-70E740481C1C}">
                 <a14:useLocalDpi xmlns:a14="http://schemas.microsoft.com/office/drawing/2010/main" val="0"/>
@@ -3425,317 +4040,15 @@
         </p:blipFill>
         <p:spPr>
           <a:xfrm>
-            <a:off x="838200" y="365125"/>
-            <a:ext cx="5181600" cy="2916419"/>
+            <a:off x="3168805" y="0"/>
+            <a:ext cx="5854390" cy="6858000"/>
           </a:xfrm>
         </p:spPr>
       </p:pic>
-      <p:pic>
-        <p:nvPicPr>
-          <p:cNvPr id="10" name="Inhaltsplatzhalter 9" descr="Ein Bild, das drinnen, Boden, schwarz, weiß enthält.&#10;&#10;Automatisch generierte Beschreibung">
-            <a:extLst>
-              <a:ext uri="{FF2B5EF4-FFF2-40B4-BE49-F238E27FC236}">
-                <a16:creationId xmlns:a16="http://schemas.microsoft.com/office/drawing/2014/main" id="{9702516F-43D1-4F02-8139-3C34CE2CD7FB}"/>
-              </a:ext>
-            </a:extLst>
-          </p:cNvPr>
-          <p:cNvPicPr>
-            <a:picLocks noGrp="1" noChangeAspect="1"/>
-          </p:cNvPicPr>
-          <p:nvPr>
-            <p:ph sz="half" idx="2"/>
-          </p:nvPr>
-        </p:nvPicPr>
-        <p:blipFill>
-          <a:blip r:embed="rId3">
-            <a:extLst>
-              <a:ext uri="{28A0092B-C50C-407E-A947-70E740481C1C}">
-                <a14:useLocalDpi xmlns:a14="http://schemas.microsoft.com/office/drawing/2010/main" val="0"/>
-              </a:ext>
-            </a:extLst>
-          </a:blip>
-          <a:stretch>
-            <a:fillRect/>
-          </a:stretch>
-        </p:blipFill>
-        <p:spPr>
-          <a:xfrm>
-            <a:off x="6172200" y="370943"/>
-            <a:ext cx="5181600" cy="2910601"/>
-          </a:xfrm>
-        </p:spPr>
-      </p:pic>
-      <p:sp>
-        <p:nvSpPr>
-          <p:cNvPr id="11" name="Titel 3">
-            <a:extLst>
-              <a:ext uri="{FF2B5EF4-FFF2-40B4-BE49-F238E27FC236}">
-                <a16:creationId xmlns:a16="http://schemas.microsoft.com/office/drawing/2014/main" id="{65019663-0AE4-472A-AA91-170B98CAB6F8}"/>
-              </a:ext>
-            </a:extLst>
-          </p:cNvPr>
-          <p:cNvSpPr txBox="1">
-            <a:spLocks/>
-          </p:cNvSpPr>
-          <p:nvPr/>
-        </p:nvSpPr>
-        <p:spPr>
-          <a:xfrm>
-            <a:off x="6172200" y="3576457"/>
-            <a:ext cx="5214257" cy="420003"/>
-          </a:xfrm>
-          <a:prstGeom prst="rect">
-            <a:avLst/>
-          </a:prstGeom>
-        </p:spPr>
-        <p:txBody>
-          <a:bodyPr vert="horz" lIns="91440" tIns="45720" rIns="91440" bIns="45720" rtlCol="0" anchor="ctr">
-            <a:normAutofit lnSpcReduction="10000"/>
-          </a:bodyPr>
-          <a:lstStyle>
-            <a:lvl1pPr algn="l" defTabSz="914400" rtl="0" eaLnBrk="1" latinLnBrk="0" hangingPunct="1">
-              <a:lnSpc>
-                <a:spcPct val="90000"/>
-              </a:lnSpc>
-              <a:spcBef>
-                <a:spcPct val="0"/>
-              </a:spcBef>
-              <a:buNone/>
-              <a:defRPr sz="4400" kern="1200">
-                <a:solidFill>
-                  <a:schemeClr val="tx1"/>
-                </a:solidFill>
-                <a:latin typeface="+mj-lt"/>
-                <a:ea typeface="+mj-ea"/>
-                <a:cs typeface="+mj-cs"/>
-              </a:defRPr>
-            </a:lvl1pPr>
-          </a:lstStyle>
-          <a:p>
-            <a:pPr algn="ctr"/>
-            <a:r>
-              <a:rPr lang="en-US" sz="1200" dirty="0" err="1"/>
-              <a:t>Rechtes</a:t>
-            </a:r>
-            <a:r>
-              <a:rPr lang="en-US" sz="1200" dirty="0"/>
-              <a:t> </a:t>
-            </a:r>
-            <a:r>
-              <a:rPr lang="en-US" sz="1200" dirty="0" err="1"/>
-              <a:t>Kamera</a:t>
-            </a:r>
-            <a:r>
-              <a:rPr lang="en-US" sz="1200" dirty="0"/>
-              <a:t> Bild</a:t>
-            </a:r>
-            <a:br>
-              <a:rPr lang="en-US" sz="1200" dirty="0"/>
-            </a:br>
-            <a:endParaRPr lang="en-DE" sz="1200" dirty="0"/>
-          </a:p>
-        </p:txBody>
-      </p:sp>
-      <p:sp>
-        <p:nvSpPr>
-          <p:cNvPr id="12" name="Titel 3">
-            <a:extLst>
-              <a:ext uri="{FF2B5EF4-FFF2-40B4-BE49-F238E27FC236}">
-                <a16:creationId xmlns:a16="http://schemas.microsoft.com/office/drawing/2014/main" id="{D91B8632-3B7A-4973-9754-C71CA802A8D5}"/>
-              </a:ext>
-            </a:extLst>
-          </p:cNvPr>
-          <p:cNvSpPr txBox="1">
-            <a:spLocks/>
-          </p:cNvSpPr>
-          <p:nvPr/>
-        </p:nvSpPr>
-        <p:spPr>
-          <a:xfrm>
-            <a:off x="3488871" y="4291373"/>
-            <a:ext cx="5214257" cy="702637"/>
-          </a:xfrm>
-          <a:prstGeom prst="rect">
-            <a:avLst/>
-          </a:prstGeom>
-        </p:spPr>
-        <p:txBody>
-          <a:bodyPr vert="horz" lIns="91440" tIns="45720" rIns="91440" bIns="45720" rtlCol="0" anchor="ctr">
-            <a:normAutofit/>
-          </a:bodyPr>
-          <a:lstStyle>
-            <a:lvl1pPr algn="l" defTabSz="914400" rtl="0" eaLnBrk="1" latinLnBrk="0" hangingPunct="1">
-              <a:lnSpc>
-                <a:spcPct val="90000"/>
-              </a:lnSpc>
-              <a:spcBef>
-                <a:spcPct val="0"/>
-              </a:spcBef>
-              <a:buNone/>
-              <a:defRPr sz="4400" kern="1200">
-                <a:solidFill>
-                  <a:schemeClr val="tx1"/>
-                </a:solidFill>
-                <a:latin typeface="+mj-lt"/>
-                <a:ea typeface="+mj-ea"/>
-                <a:cs typeface="+mj-cs"/>
-              </a:defRPr>
-            </a:lvl1pPr>
-          </a:lstStyle>
-          <a:p>
-            <a:pPr algn="ctr"/>
-            <a:r>
-              <a:rPr lang="en-US" sz="1200" dirty="0" err="1"/>
-              <a:t>Entfernung</a:t>
-            </a:r>
-            <a:r>
-              <a:rPr lang="en-US" sz="1200" dirty="0"/>
-              <a:t> </a:t>
-            </a:r>
-            <a:r>
-              <a:rPr lang="en-US" sz="1200" dirty="0" err="1"/>
-              <a:t>zu</a:t>
-            </a:r>
-            <a:r>
-              <a:rPr lang="en-US" sz="1200" dirty="0"/>
-              <a:t> Blatt Papier 15cm </a:t>
-            </a:r>
-          </a:p>
-          <a:p>
-            <a:pPr algn="ctr"/>
-            <a:r>
-              <a:rPr lang="en-US" sz="1200" dirty="0" err="1"/>
-              <a:t>Entfernung</a:t>
-            </a:r>
-            <a:r>
-              <a:rPr lang="en-US" sz="1200" dirty="0"/>
-              <a:t> </a:t>
-            </a:r>
-            <a:r>
-              <a:rPr lang="en-US" sz="1200" dirty="0" err="1"/>
-              <a:t>Kameras</a:t>
-            </a:r>
-            <a:r>
-              <a:rPr lang="en-US" sz="1200" dirty="0"/>
-              <a:t> 6cm</a:t>
-            </a:r>
-          </a:p>
-          <a:p>
-            <a:pPr algn="ctr"/>
-            <a:r>
-              <a:rPr lang="en-US" sz="1200" dirty="0" err="1"/>
-              <a:t>Groesse</a:t>
-            </a:r>
-            <a:r>
-              <a:rPr lang="en-US" sz="1200" dirty="0"/>
-              <a:t> Karo 2cm</a:t>
-            </a:r>
-            <a:endParaRPr lang="en-DE" sz="1200" dirty="0"/>
-          </a:p>
-        </p:txBody>
-      </p:sp>
-      <p:sp>
-        <p:nvSpPr>
-          <p:cNvPr id="13" name="Titel 3">
-            <a:extLst>
-              <a:ext uri="{FF2B5EF4-FFF2-40B4-BE49-F238E27FC236}">
-                <a16:creationId xmlns:a16="http://schemas.microsoft.com/office/drawing/2014/main" id="{76BA87B8-4F77-49CD-9F4D-80C3D6DBCD36}"/>
-              </a:ext>
-            </a:extLst>
-          </p:cNvPr>
-          <p:cNvSpPr txBox="1">
-            <a:spLocks/>
-          </p:cNvSpPr>
-          <p:nvPr/>
-        </p:nvSpPr>
-        <p:spPr>
-          <a:xfrm>
-            <a:off x="3488871" y="5301202"/>
-            <a:ext cx="5214257" cy="702637"/>
-          </a:xfrm>
-          <a:prstGeom prst="rect">
-            <a:avLst/>
-          </a:prstGeom>
-        </p:spPr>
-        <p:txBody>
-          <a:bodyPr vert="horz" lIns="91440" tIns="45720" rIns="91440" bIns="45720" rtlCol="0" anchor="ctr">
-            <a:normAutofit/>
-          </a:bodyPr>
-          <a:lstStyle>
-            <a:lvl1pPr algn="l" defTabSz="914400" rtl="0" eaLnBrk="1" latinLnBrk="0" hangingPunct="1">
-              <a:lnSpc>
-                <a:spcPct val="90000"/>
-              </a:lnSpc>
-              <a:spcBef>
-                <a:spcPct val="0"/>
-              </a:spcBef>
-              <a:buNone/>
-              <a:defRPr sz="4400" kern="1200">
-                <a:solidFill>
-                  <a:schemeClr val="tx1"/>
-                </a:solidFill>
-                <a:latin typeface="+mj-lt"/>
-                <a:ea typeface="+mj-ea"/>
-                <a:cs typeface="+mj-cs"/>
-              </a:defRPr>
-            </a:lvl1pPr>
-          </a:lstStyle>
-          <a:p>
-            <a:pPr algn="ctr"/>
-            <a:r>
-              <a:rPr lang="en-US" sz="1200" dirty="0" err="1"/>
-              <a:t>Entfernung</a:t>
-            </a:r>
-            <a:r>
-              <a:rPr lang="en-US" sz="1200" dirty="0"/>
-              <a:t> </a:t>
-            </a:r>
-            <a:r>
-              <a:rPr lang="en-US" sz="1200" dirty="0" err="1"/>
-              <a:t>zu</a:t>
-            </a:r>
-            <a:r>
-              <a:rPr lang="en-US" sz="1200" dirty="0"/>
-              <a:t> Blatt Papier 15cm </a:t>
-            </a:r>
-          </a:p>
-          <a:p>
-            <a:pPr algn="ctr"/>
-            <a:r>
-              <a:rPr lang="en-US" sz="1200" dirty="0" err="1"/>
-              <a:t>Entfernung</a:t>
-            </a:r>
-            <a:r>
-              <a:rPr lang="en-US" sz="1200" dirty="0"/>
-              <a:t> </a:t>
-            </a:r>
-            <a:r>
-              <a:rPr lang="en-US" sz="1200" dirty="0" err="1"/>
-              <a:t>Kameras</a:t>
-            </a:r>
-            <a:r>
-              <a:rPr lang="en-US" sz="1200" dirty="0"/>
-              <a:t> 6cm</a:t>
-            </a:r>
-          </a:p>
-          <a:p>
-            <a:pPr algn="ctr"/>
-            <a:r>
-              <a:rPr lang="en-US" sz="1200" dirty="0" err="1"/>
-              <a:t>Groesse</a:t>
-            </a:r>
-            <a:r>
-              <a:rPr lang="en-US" sz="1200" dirty="0"/>
-              <a:t> Karo 2cm</a:t>
-            </a:r>
-            <a:endParaRPr lang="en-DE" sz="1200" dirty="0"/>
-          </a:p>
-        </p:txBody>
-      </p:sp>
     </p:spTree>
     <p:extLst>
       <p:ext uri="{BB962C8B-B14F-4D97-AF65-F5344CB8AC3E}">
-        <p14:creationId xmlns:p14="http://schemas.microsoft.com/office/powerpoint/2010/main" val="502218586"/>
+        <p14:creationId xmlns:p14="http://schemas.microsoft.com/office/powerpoint/2010/main" val="2968658721"/>
       </p:ext>
     </p:extLst>
   </p:cSld>
@@ -3764,10 +4077,10 @@
       </p:grpSpPr>
       <p:sp>
         <p:nvSpPr>
-          <p:cNvPr id="2" name="Titel 1">
-            <a:extLst>
-              <a:ext uri="{FF2B5EF4-FFF2-40B4-BE49-F238E27FC236}">
-                <a16:creationId xmlns:a16="http://schemas.microsoft.com/office/drawing/2014/main" id="{3C1BCAB6-2749-43AC-B511-4F9772616CAB}"/>
+          <p:cNvPr id="4" name="Titel 3">
+            <a:extLst>
+              <a:ext uri="{FF2B5EF4-FFF2-40B4-BE49-F238E27FC236}">
+                <a16:creationId xmlns:a16="http://schemas.microsoft.com/office/drawing/2014/main" id="{DF8571DC-9EE8-4F78-A0C8-9C1F3D6041BA}"/>
               </a:ext>
             </a:extLst>
           </p:cNvPr>
@@ -3780,45 +4093,46 @@
         </p:nvSpPr>
         <p:spPr>
           <a:xfrm>
-            <a:off x="606490" y="5058423"/>
-            <a:ext cx="10515600" cy="1325563"/>
+            <a:off x="805543" y="3572311"/>
+            <a:ext cx="5214257" cy="420003"/>
           </a:xfrm>
         </p:spPr>
         <p:txBody>
-          <a:bodyPr/>
+          <a:bodyPr>
+            <a:normAutofit fontScale="90000"/>
+          </a:bodyPr>
           <a:lstStyle/>
           <a:p>
             <a:pPr algn="ctr"/>
             <a:r>
-              <a:rPr lang="en-US" dirty="0" err="1"/>
-              <a:t>Kalibrierung</a:t>
-            </a:r>
-            <a:r>
-              <a:rPr lang="en-US" dirty="0"/>
+              <a:rPr lang="en-US" sz="1800" dirty="0" err="1"/>
+              <a:t>Linkes</a:t>
+            </a:r>
+            <a:r>
+              <a:rPr lang="en-US" sz="1800" dirty="0"/>
               <a:t> </a:t>
             </a:r>
             <a:r>
-              <a:rPr lang="en-US" dirty="0" err="1"/>
-              <a:t>ueber</a:t>
-            </a:r>
-            <a:r>
-              <a:rPr lang="en-US" dirty="0"/>
-              <a:t> </a:t>
-            </a:r>
-            <a:r>
-              <a:rPr lang="en-US" dirty="0" err="1"/>
-              <a:t>Schachbrettmuster</a:t>
-            </a:r>
-            <a:endParaRPr lang="en-DE" dirty="0"/>
+              <a:rPr lang="en-US" sz="1800" dirty="0" err="1"/>
+              <a:t>Kamera</a:t>
+            </a:r>
+            <a:r>
+              <a:rPr lang="en-US" sz="1800" dirty="0"/>
+              <a:t> Bild</a:t>
+            </a:r>
+            <a:br>
+              <a:rPr lang="en-US" sz="1200" dirty="0"/>
+            </a:br>
+            <a:endParaRPr lang="en-DE" sz="1200" dirty="0"/>
           </a:p>
         </p:txBody>
       </p:sp>
       <p:pic>
         <p:nvPicPr>
-          <p:cNvPr id="6" name="Inhaltsplatzhalter 5">
-            <a:extLst>
-              <a:ext uri="{FF2B5EF4-FFF2-40B4-BE49-F238E27FC236}">
-                <a16:creationId xmlns:a16="http://schemas.microsoft.com/office/drawing/2014/main" id="{F973B66B-AB67-4004-BE34-9B69AF4D4D89}"/>
+          <p:cNvPr id="8" name="Inhaltsplatzhalter 7" descr="Ein Bild, das drinnen, Boden, schwarz, weiß enthält.&#10;&#10;Automatisch generierte Beschreibung">
+            <a:extLst>
+              <a:ext uri="{FF2B5EF4-FFF2-40B4-BE49-F238E27FC236}">
+                <a16:creationId xmlns:a16="http://schemas.microsoft.com/office/drawing/2014/main" id="{A5659F69-5508-4DC6-BEA6-E6CBA03BD2A3}"/>
               </a:ext>
             </a:extLst>
           </p:cNvPr>
@@ -3843,15 +4157,696 @@
         </p:blipFill>
         <p:spPr>
           <a:xfrm>
-            <a:off x="3688621" y="365125"/>
-            <a:ext cx="4351338" cy="4351338"/>
+            <a:off x="302823" y="205267"/>
+            <a:ext cx="5465619" cy="3076277"/>
+          </a:xfrm>
+        </p:spPr>
+      </p:pic>
+      <p:pic>
+        <p:nvPicPr>
+          <p:cNvPr id="10" name="Inhaltsplatzhalter 9" descr="Ein Bild, das drinnen, Boden, schwarz, weiß enthält.&#10;&#10;Automatisch generierte Beschreibung">
+            <a:extLst>
+              <a:ext uri="{FF2B5EF4-FFF2-40B4-BE49-F238E27FC236}">
+                <a16:creationId xmlns:a16="http://schemas.microsoft.com/office/drawing/2014/main" id="{9702516F-43D1-4F02-8139-3C34CE2CD7FB}"/>
+              </a:ext>
+            </a:extLst>
+          </p:cNvPr>
+          <p:cNvPicPr>
+            <a:picLocks noGrp="1" noChangeAspect="1"/>
+          </p:cNvPicPr>
+          <p:nvPr>
+            <p:ph sz="half" idx="2"/>
+          </p:nvPr>
+        </p:nvPicPr>
+        <p:blipFill>
+          <a:blip r:embed="rId3">
+            <a:extLst>
+              <a:ext uri="{28A0092B-C50C-407E-A947-70E740481C1C}">
+                <a14:useLocalDpi xmlns:a14="http://schemas.microsoft.com/office/drawing/2010/main" val="0"/>
+              </a:ext>
+            </a:extLst>
+          </a:blip>
+          <a:stretch>
+            <a:fillRect/>
+          </a:stretch>
+        </p:blipFill>
+        <p:spPr>
+          <a:xfrm>
+            <a:off x="6172200" y="3281544"/>
+            <a:ext cx="5716977" cy="3211332"/>
+          </a:xfrm>
+        </p:spPr>
+      </p:pic>
+      <p:sp>
+        <p:nvSpPr>
+          <p:cNvPr id="11" name="Titel 3">
+            <a:extLst>
+              <a:ext uri="{FF2B5EF4-FFF2-40B4-BE49-F238E27FC236}">
+                <a16:creationId xmlns:a16="http://schemas.microsoft.com/office/drawing/2014/main" id="{65019663-0AE4-472A-AA91-170B98CAB6F8}"/>
+              </a:ext>
+            </a:extLst>
+          </p:cNvPr>
+          <p:cNvSpPr txBox="1">
+            <a:spLocks/>
+          </p:cNvSpPr>
+          <p:nvPr/>
+        </p:nvSpPr>
+        <p:spPr>
+          <a:xfrm>
+            <a:off x="6423559" y="2861541"/>
+            <a:ext cx="5214257" cy="420003"/>
+          </a:xfrm>
+          <a:prstGeom prst="rect">
+            <a:avLst/>
+          </a:prstGeom>
+        </p:spPr>
+        <p:txBody>
+          <a:bodyPr vert="horz" lIns="91440" tIns="45720" rIns="91440" bIns="45720" rtlCol="0" anchor="ctr">
+            <a:normAutofit/>
+          </a:bodyPr>
+          <a:lstStyle>
+            <a:lvl1pPr algn="l" defTabSz="914400" rtl="0" eaLnBrk="1" latinLnBrk="0" hangingPunct="1">
+              <a:lnSpc>
+                <a:spcPct val="90000"/>
+              </a:lnSpc>
+              <a:spcBef>
+                <a:spcPct val="0"/>
+              </a:spcBef>
+              <a:buNone/>
+              <a:defRPr sz="4400" kern="1200">
+                <a:solidFill>
+                  <a:schemeClr val="tx1"/>
+                </a:solidFill>
+                <a:latin typeface="+mj-lt"/>
+                <a:ea typeface="+mj-ea"/>
+                <a:cs typeface="+mj-cs"/>
+              </a:defRPr>
+            </a:lvl1pPr>
+          </a:lstStyle>
+          <a:p>
+            <a:pPr algn="ctr"/>
+            <a:r>
+              <a:rPr lang="en-US" sz="1600" dirty="0" err="1"/>
+              <a:t>Rechtes</a:t>
+            </a:r>
+            <a:r>
+              <a:rPr lang="en-US" sz="1600" dirty="0"/>
+              <a:t> </a:t>
+            </a:r>
+            <a:r>
+              <a:rPr lang="en-US" sz="1600" dirty="0" err="1"/>
+              <a:t>Kamera</a:t>
+            </a:r>
+            <a:r>
+              <a:rPr lang="en-US" sz="1600" dirty="0"/>
+              <a:t> Bild</a:t>
+            </a:r>
+            <a:endParaRPr lang="en-DE" sz="1600" dirty="0"/>
+          </a:p>
+        </p:txBody>
+      </p:sp>
+    </p:spTree>
+    <p:extLst>
+      <p:ext uri="{BB962C8B-B14F-4D97-AF65-F5344CB8AC3E}">
+        <p14:creationId xmlns:p14="http://schemas.microsoft.com/office/powerpoint/2010/main" val="502218586"/>
+      </p:ext>
+    </p:extLst>
+  </p:cSld>
+  <p:clrMapOvr>
+    <a:masterClrMapping/>
+  </p:clrMapOvr>
+</p:sld>
+</file>
+
+<file path=ppt/slides/slide3.xml><?xml version="1.0" encoding="utf-8"?>
+<p:sld xmlns:a="http://schemas.openxmlformats.org/drawingml/2006/main" xmlns:r="http://schemas.openxmlformats.org/officeDocument/2006/relationships" xmlns:p="http://schemas.openxmlformats.org/presentationml/2006/main">
+  <p:cSld>
+    <p:spTree>
+      <p:nvGrpSpPr>
+        <p:cNvPr id="1" name=""/>
+        <p:cNvGrpSpPr/>
+        <p:nvPr/>
+      </p:nvGrpSpPr>
+      <p:grpSpPr>
+        <a:xfrm>
+          <a:off x="0" y="0"/>
+          <a:ext cx="0" cy="0"/>
+          <a:chOff x="0" y="0"/>
+          <a:chExt cx="0" cy="0"/>
+        </a:xfrm>
+      </p:grpSpPr>
+      <p:pic>
+        <p:nvPicPr>
+          <p:cNvPr id="10" name="Inhaltsplatzhalter 9">
+            <a:extLst>
+              <a:ext uri="{FF2B5EF4-FFF2-40B4-BE49-F238E27FC236}">
+                <a16:creationId xmlns:a16="http://schemas.microsoft.com/office/drawing/2014/main" id="{D06E0CA4-A413-4435-9E6A-550CD7E7CA11}"/>
+              </a:ext>
+            </a:extLst>
+          </p:cNvPr>
+          <p:cNvPicPr>
+            <a:picLocks noGrp="1" noChangeAspect="1"/>
+          </p:cNvPicPr>
+          <p:nvPr>
+            <p:ph sz="half" idx="1"/>
+          </p:nvPr>
+        </p:nvPicPr>
+        <p:blipFill>
+          <a:blip r:embed="rId2">
+            <a:extLst>
+              <a:ext uri="{28A0092B-C50C-407E-A947-70E740481C1C}">
+                <a14:useLocalDpi xmlns:a14="http://schemas.microsoft.com/office/drawing/2010/main" val="0"/>
+              </a:ext>
+            </a:extLst>
+          </a:blip>
+          <a:stretch>
+            <a:fillRect/>
+          </a:stretch>
+        </p:blipFill>
+        <p:spPr>
+          <a:xfrm>
+            <a:off x="2932922" y="848205"/>
+            <a:ext cx="6326155" cy="5161589"/>
           </a:xfrm>
         </p:spPr>
       </p:pic>
     </p:spTree>
     <p:extLst>
       <p:ext uri="{BB962C8B-B14F-4D97-AF65-F5344CB8AC3E}">
-        <p14:creationId xmlns:p14="http://schemas.microsoft.com/office/powerpoint/2010/main" val="2968658721"/>
+        <p14:creationId xmlns:p14="http://schemas.microsoft.com/office/powerpoint/2010/main" val="793816576"/>
+      </p:ext>
+    </p:extLst>
+  </p:cSld>
+  <p:clrMapOvr>
+    <a:masterClrMapping/>
+  </p:clrMapOvr>
+</p:sld>
+</file>
+
+<file path=ppt/slides/slide4.xml><?xml version="1.0" encoding="utf-8"?>
+<p:sld xmlns:a="http://schemas.openxmlformats.org/drawingml/2006/main" xmlns:r="http://schemas.openxmlformats.org/officeDocument/2006/relationships" xmlns:p="http://schemas.openxmlformats.org/presentationml/2006/main">
+  <p:cSld>
+    <p:spTree>
+      <p:nvGrpSpPr>
+        <p:cNvPr id="1" name=""/>
+        <p:cNvGrpSpPr/>
+        <p:nvPr/>
+      </p:nvGrpSpPr>
+      <p:grpSpPr>
+        <a:xfrm>
+          <a:off x="0" y="0"/>
+          <a:ext cx="0" cy="0"/>
+          <a:chOff x="0" y="0"/>
+          <a:chExt cx="0" cy="0"/>
+        </a:xfrm>
+      </p:grpSpPr>
+      <p:sp>
+        <p:nvSpPr>
+          <p:cNvPr id="5" name="Rechteck 4">
+            <a:extLst>
+              <a:ext uri="{FF2B5EF4-FFF2-40B4-BE49-F238E27FC236}">
+                <a16:creationId xmlns:a16="http://schemas.microsoft.com/office/drawing/2014/main" id="{883C2217-7F62-445D-8440-BC4068CEB0E5}"/>
+              </a:ext>
+            </a:extLst>
+          </p:cNvPr>
+          <p:cNvSpPr/>
+          <p:nvPr/>
+        </p:nvSpPr>
+        <p:spPr>
+          <a:xfrm>
+            <a:off x="5112278" y="919783"/>
+            <a:ext cx="1427584" cy="951723"/>
+          </a:xfrm>
+          <a:prstGeom prst="rect">
+            <a:avLst/>
+          </a:prstGeom>
+        </p:spPr>
+        <p:style>
+          <a:lnRef idx="2">
+            <a:schemeClr val="accent1">
+              <a:shade val="50000"/>
+            </a:schemeClr>
+          </a:lnRef>
+          <a:fillRef idx="1">
+            <a:schemeClr val="accent1"/>
+          </a:fillRef>
+          <a:effectRef idx="0">
+            <a:schemeClr val="accent1"/>
+          </a:effectRef>
+          <a:fontRef idx="minor">
+            <a:schemeClr val="lt1"/>
+          </a:fontRef>
+        </p:style>
+        <p:txBody>
+          <a:bodyPr rtlCol="0" anchor="ctr"/>
+          <a:lstStyle/>
+          <a:p>
+            <a:pPr algn="ctr"/>
+            <a:r>
+              <a:rPr lang="en-US" dirty="0" err="1"/>
+              <a:t>Objekt</a:t>
+            </a:r>
+            <a:endParaRPr lang="en-DE" dirty="0"/>
+          </a:p>
+        </p:txBody>
+      </p:sp>
+      <p:sp>
+        <p:nvSpPr>
+          <p:cNvPr id="6" name="Gleichschenkliges Dreieck 5">
+            <a:extLst>
+              <a:ext uri="{FF2B5EF4-FFF2-40B4-BE49-F238E27FC236}">
+                <a16:creationId xmlns:a16="http://schemas.microsoft.com/office/drawing/2014/main" id="{866A9D9A-A67B-44DE-BBFB-9C265C14DDC9}"/>
+              </a:ext>
+            </a:extLst>
+          </p:cNvPr>
+          <p:cNvSpPr/>
+          <p:nvPr/>
+        </p:nvSpPr>
+        <p:spPr>
+          <a:xfrm>
+            <a:off x="2914201" y="5574323"/>
+            <a:ext cx="2198077" cy="571500"/>
+          </a:xfrm>
+          <a:prstGeom prst="triangle">
+            <a:avLst/>
+          </a:prstGeom>
+        </p:spPr>
+        <p:style>
+          <a:lnRef idx="2">
+            <a:schemeClr val="accent1">
+              <a:shade val="50000"/>
+            </a:schemeClr>
+          </a:lnRef>
+          <a:fillRef idx="1">
+            <a:schemeClr val="accent1"/>
+          </a:fillRef>
+          <a:effectRef idx="0">
+            <a:schemeClr val="accent1"/>
+          </a:effectRef>
+          <a:fontRef idx="minor">
+            <a:schemeClr val="lt1"/>
+          </a:fontRef>
+        </p:style>
+        <p:txBody>
+          <a:bodyPr rtlCol="0" anchor="ctr"/>
+          <a:lstStyle/>
+          <a:p>
+            <a:pPr algn="ctr"/>
+            <a:r>
+              <a:rPr lang="en-US" dirty="0"/>
+              <a:t>Kamera1</a:t>
+            </a:r>
+            <a:endParaRPr lang="en-DE" dirty="0"/>
+          </a:p>
+        </p:txBody>
+      </p:sp>
+      <p:sp>
+        <p:nvSpPr>
+          <p:cNvPr id="7" name="Gleichschenkliges Dreieck 6">
+            <a:extLst>
+              <a:ext uri="{FF2B5EF4-FFF2-40B4-BE49-F238E27FC236}">
+                <a16:creationId xmlns:a16="http://schemas.microsoft.com/office/drawing/2014/main" id="{94B24205-2797-40DD-B291-754F7102ECDB}"/>
+              </a:ext>
+            </a:extLst>
+          </p:cNvPr>
+          <p:cNvSpPr/>
+          <p:nvPr/>
+        </p:nvSpPr>
+        <p:spPr>
+          <a:xfrm>
+            <a:off x="6539862" y="5574323"/>
+            <a:ext cx="2198077" cy="571500"/>
+          </a:xfrm>
+          <a:prstGeom prst="triangle">
+            <a:avLst/>
+          </a:prstGeom>
+        </p:spPr>
+        <p:style>
+          <a:lnRef idx="2">
+            <a:schemeClr val="accent1">
+              <a:shade val="50000"/>
+            </a:schemeClr>
+          </a:lnRef>
+          <a:fillRef idx="1">
+            <a:schemeClr val="accent1"/>
+          </a:fillRef>
+          <a:effectRef idx="0">
+            <a:schemeClr val="accent1"/>
+          </a:effectRef>
+          <a:fontRef idx="minor">
+            <a:schemeClr val="lt1"/>
+          </a:fontRef>
+        </p:style>
+        <p:txBody>
+          <a:bodyPr rtlCol="0" anchor="ctr"/>
+          <a:lstStyle/>
+          <a:p>
+            <a:pPr algn="ctr"/>
+            <a:r>
+              <a:rPr lang="en-US" dirty="0"/>
+              <a:t>Kamera2</a:t>
+            </a:r>
+            <a:endParaRPr lang="en-DE" dirty="0"/>
+          </a:p>
+        </p:txBody>
+      </p:sp>
+      <p:cxnSp>
+        <p:nvCxnSpPr>
+          <p:cNvPr id="9" name="Gerade Verbindung mit Pfeil 8">
+            <a:extLst>
+              <a:ext uri="{FF2B5EF4-FFF2-40B4-BE49-F238E27FC236}">
+                <a16:creationId xmlns:a16="http://schemas.microsoft.com/office/drawing/2014/main" id="{29540AC4-D4F6-4F19-8CAE-41A4C59C23B3}"/>
+              </a:ext>
+            </a:extLst>
+          </p:cNvPr>
+          <p:cNvCxnSpPr>
+            <a:stCxn id="6" idx="0"/>
+          </p:cNvCxnSpPr>
+          <p:nvPr/>
+        </p:nvCxnSpPr>
+        <p:spPr>
+          <a:xfrm flipV="1">
+            <a:off x="4013240" y="1872762"/>
+            <a:ext cx="1099038" cy="3701561"/>
+          </a:xfrm>
+          <a:prstGeom prst="straightConnector1">
+            <a:avLst/>
+          </a:prstGeom>
+          <a:ln w="19050">
+            <a:tailEnd type="triangle"/>
+          </a:ln>
+        </p:spPr>
+        <p:style>
+          <a:lnRef idx="1">
+            <a:schemeClr val="accent2"/>
+          </a:lnRef>
+          <a:fillRef idx="0">
+            <a:schemeClr val="accent2"/>
+          </a:fillRef>
+          <a:effectRef idx="0">
+            <a:schemeClr val="accent2"/>
+          </a:effectRef>
+          <a:fontRef idx="minor">
+            <a:schemeClr val="tx1"/>
+          </a:fontRef>
+        </p:style>
+      </p:cxnSp>
+      <p:cxnSp>
+        <p:nvCxnSpPr>
+          <p:cNvPr id="10" name="Gerade Verbindung mit Pfeil 9">
+            <a:extLst>
+              <a:ext uri="{FF2B5EF4-FFF2-40B4-BE49-F238E27FC236}">
+                <a16:creationId xmlns:a16="http://schemas.microsoft.com/office/drawing/2014/main" id="{8FAE6109-9F21-4AF9-8318-3222AEB7829F}"/>
+              </a:ext>
+            </a:extLst>
+          </p:cNvPr>
+          <p:cNvCxnSpPr>
+            <a:cxnSpLocks/>
+            <a:stCxn id="6" idx="0"/>
+          </p:cNvCxnSpPr>
+          <p:nvPr/>
+        </p:nvCxnSpPr>
+        <p:spPr>
+          <a:xfrm flipV="1">
+            <a:off x="4013240" y="919783"/>
+            <a:ext cx="1099038" cy="4654540"/>
+          </a:xfrm>
+          <a:prstGeom prst="straightConnector1">
+            <a:avLst/>
+          </a:prstGeom>
+          <a:ln w="19050">
+            <a:tailEnd type="triangle"/>
+          </a:ln>
+        </p:spPr>
+        <p:style>
+          <a:lnRef idx="1">
+            <a:schemeClr val="accent2"/>
+          </a:lnRef>
+          <a:fillRef idx="0">
+            <a:schemeClr val="accent2"/>
+          </a:fillRef>
+          <a:effectRef idx="0">
+            <a:schemeClr val="accent2"/>
+          </a:effectRef>
+          <a:fontRef idx="minor">
+            <a:schemeClr val="tx1"/>
+          </a:fontRef>
+        </p:style>
+      </p:cxnSp>
+      <p:cxnSp>
+        <p:nvCxnSpPr>
+          <p:cNvPr id="11" name="Gerade Verbindung mit Pfeil 10">
+            <a:extLst>
+              <a:ext uri="{FF2B5EF4-FFF2-40B4-BE49-F238E27FC236}">
+                <a16:creationId xmlns:a16="http://schemas.microsoft.com/office/drawing/2014/main" id="{323FE8D1-56DF-4054-8C09-97F13F6EE102}"/>
+              </a:ext>
+            </a:extLst>
+          </p:cNvPr>
+          <p:cNvCxnSpPr>
+            <a:cxnSpLocks/>
+            <a:stCxn id="6" idx="0"/>
+          </p:cNvCxnSpPr>
+          <p:nvPr/>
+        </p:nvCxnSpPr>
+        <p:spPr>
+          <a:xfrm flipV="1">
+            <a:off x="4013240" y="1871507"/>
+            <a:ext cx="2526622" cy="3702816"/>
+          </a:xfrm>
+          <a:prstGeom prst="straightConnector1">
+            <a:avLst/>
+          </a:prstGeom>
+          <a:ln w="19050">
+            <a:tailEnd type="triangle"/>
+          </a:ln>
+        </p:spPr>
+        <p:style>
+          <a:lnRef idx="1">
+            <a:schemeClr val="accent2"/>
+          </a:lnRef>
+          <a:fillRef idx="0">
+            <a:schemeClr val="accent2"/>
+          </a:fillRef>
+          <a:effectRef idx="0">
+            <a:schemeClr val="accent2"/>
+          </a:effectRef>
+          <a:fontRef idx="minor">
+            <a:schemeClr val="tx1"/>
+          </a:fontRef>
+        </p:style>
+      </p:cxnSp>
+      <p:cxnSp>
+        <p:nvCxnSpPr>
+          <p:cNvPr id="12" name="Gerade Verbindung mit Pfeil 11">
+            <a:extLst>
+              <a:ext uri="{FF2B5EF4-FFF2-40B4-BE49-F238E27FC236}">
+                <a16:creationId xmlns:a16="http://schemas.microsoft.com/office/drawing/2014/main" id="{A24D2A0B-ED1D-4268-8C14-5165AFCD4129}"/>
+              </a:ext>
+            </a:extLst>
+          </p:cNvPr>
+          <p:cNvCxnSpPr>
+            <a:cxnSpLocks/>
+            <a:stCxn id="6" idx="0"/>
+          </p:cNvCxnSpPr>
+          <p:nvPr/>
+        </p:nvCxnSpPr>
+        <p:spPr>
+          <a:xfrm flipV="1">
+            <a:off x="4013240" y="919783"/>
+            <a:ext cx="2526622" cy="4654540"/>
+          </a:xfrm>
+          <a:prstGeom prst="straightConnector1">
+            <a:avLst/>
+          </a:prstGeom>
+          <a:ln w="19050">
+            <a:tailEnd type="triangle"/>
+          </a:ln>
+        </p:spPr>
+        <p:style>
+          <a:lnRef idx="1">
+            <a:schemeClr val="accent2"/>
+          </a:lnRef>
+          <a:fillRef idx="0">
+            <a:schemeClr val="accent2"/>
+          </a:fillRef>
+          <a:effectRef idx="0">
+            <a:schemeClr val="accent2"/>
+          </a:effectRef>
+          <a:fontRef idx="minor">
+            <a:schemeClr val="tx1"/>
+          </a:fontRef>
+        </p:style>
+      </p:cxnSp>
+      <p:cxnSp>
+        <p:nvCxnSpPr>
+          <p:cNvPr id="20" name="Gerade Verbindung mit Pfeil 19">
+            <a:extLst>
+              <a:ext uri="{FF2B5EF4-FFF2-40B4-BE49-F238E27FC236}">
+                <a16:creationId xmlns:a16="http://schemas.microsoft.com/office/drawing/2014/main" id="{C0193326-CCBF-4679-9833-51F240A5C863}"/>
+              </a:ext>
+            </a:extLst>
+          </p:cNvPr>
+          <p:cNvCxnSpPr>
+            <a:stCxn id="7" idx="0"/>
+          </p:cNvCxnSpPr>
+          <p:nvPr/>
+        </p:nvCxnSpPr>
+        <p:spPr>
+          <a:xfrm flipH="1" flipV="1">
+            <a:off x="6539862" y="1871506"/>
+            <a:ext cx="1099039" cy="3702817"/>
+          </a:xfrm>
+          <a:prstGeom prst="straightConnector1">
+            <a:avLst/>
+          </a:prstGeom>
+          <a:ln w="28575">
+            <a:tailEnd type="triangle"/>
+          </a:ln>
+        </p:spPr>
+        <p:style>
+          <a:lnRef idx="1">
+            <a:schemeClr val="accent6"/>
+          </a:lnRef>
+          <a:fillRef idx="0">
+            <a:schemeClr val="accent6"/>
+          </a:fillRef>
+          <a:effectRef idx="0">
+            <a:schemeClr val="accent6"/>
+          </a:effectRef>
+          <a:fontRef idx="minor">
+            <a:schemeClr val="tx1"/>
+          </a:fontRef>
+        </p:style>
+      </p:cxnSp>
+      <p:cxnSp>
+        <p:nvCxnSpPr>
+          <p:cNvPr id="21" name="Gerade Verbindung mit Pfeil 20">
+            <a:extLst>
+              <a:ext uri="{FF2B5EF4-FFF2-40B4-BE49-F238E27FC236}">
+                <a16:creationId xmlns:a16="http://schemas.microsoft.com/office/drawing/2014/main" id="{54D6FB6F-15AE-48CB-89F0-A42C47FA8C15}"/>
+              </a:ext>
+            </a:extLst>
+          </p:cNvPr>
+          <p:cNvCxnSpPr>
+            <a:cxnSpLocks/>
+            <a:stCxn id="7" idx="0"/>
+          </p:cNvCxnSpPr>
+          <p:nvPr/>
+        </p:nvCxnSpPr>
+        <p:spPr>
+          <a:xfrm flipH="1" flipV="1">
+            <a:off x="5097793" y="919785"/>
+            <a:ext cx="2541108" cy="4654538"/>
+          </a:xfrm>
+          <a:prstGeom prst="straightConnector1">
+            <a:avLst/>
+          </a:prstGeom>
+          <a:ln w="28575">
+            <a:tailEnd type="triangle"/>
+          </a:ln>
+        </p:spPr>
+        <p:style>
+          <a:lnRef idx="1">
+            <a:schemeClr val="accent6"/>
+          </a:lnRef>
+          <a:fillRef idx="0">
+            <a:schemeClr val="accent6"/>
+          </a:fillRef>
+          <a:effectRef idx="0">
+            <a:schemeClr val="accent6"/>
+          </a:effectRef>
+          <a:fontRef idx="minor">
+            <a:schemeClr val="tx1"/>
+          </a:fontRef>
+        </p:style>
+      </p:cxnSp>
+      <p:cxnSp>
+        <p:nvCxnSpPr>
+          <p:cNvPr id="22" name="Gerade Verbindung mit Pfeil 21">
+            <a:extLst>
+              <a:ext uri="{FF2B5EF4-FFF2-40B4-BE49-F238E27FC236}">
+                <a16:creationId xmlns:a16="http://schemas.microsoft.com/office/drawing/2014/main" id="{F03354B9-F9E2-436A-A863-53D5E8AE0F1D}"/>
+              </a:ext>
+            </a:extLst>
+          </p:cNvPr>
+          <p:cNvCxnSpPr>
+            <a:cxnSpLocks/>
+            <a:stCxn id="7" idx="0"/>
+          </p:cNvCxnSpPr>
+          <p:nvPr/>
+        </p:nvCxnSpPr>
+        <p:spPr>
+          <a:xfrm flipH="1" flipV="1">
+            <a:off x="5107449" y="1871507"/>
+            <a:ext cx="2531452" cy="3702816"/>
+          </a:xfrm>
+          <a:prstGeom prst="straightConnector1">
+            <a:avLst/>
+          </a:prstGeom>
+          <a:ln w="28575">
+            <a:tailEnd type="triangle"/>
+          </a:ln>
+        </p:spPr>
+        <p:style>
+          <a:lnRef idx="1">
+            <a:schemeClr val="accent6"/>
+          </a:lnRef>
+          <a:fillRef idx="0">
+            <a:schemeClr val="accent6"/>
+          </a:fillRef>
+          <a:effectRef idx="0">
+            <a:schemeClr val="accent6"/>
+          </a:effectRef>
+          <a:fontRef idx="minor">
+            <a:schemeClr val="tx1"/>
+          </a:fontRef>
+        </p:style>
+      </p:cxnSp>
+      <p:cxnSp>
+        <p:nvCxnSpPr>
+          <p:cNvPr id="23" name="Gerade Verbindung mit Pfeil 22">
+            <a:extLst>
+              <a:ext uri="{FF2B5EF4-FFF2-40B4-BE49-F238E27FC236}">
+                <a16:creationId xmlns:a16="http://schemas.microsoft.com/office/drawing/2014/main" id="{61E63272-B7C1-406D-B847-7DA6DF1F862C}"/>
+              </a:ext>
+            </a:extLst>
+          </p:cNvPr>
+          <p:cNvCxnSpPr>
+            <a:cxnSpLocks/>
+          </p:cNvCxnSpPr>
+          <p:nvPr/>
+        </p:nvCxnSpPr>
+        <p:spPr>
+          <a:xfrm flipH="1" flipV="1">
+            <a:off x="6530205" y="919785"/>
+            <a:ext cx="1099038" cy="4654538"/>
+          </a:xfrm>
+          <a:prstGeom prst="straightConnector1">
+            <a:avLst/>
+          </a:prstGeom>
+          <a:ln w="28575">
+            <a:tailEnd type="triangle"/>
+          </a:ln>
+        </p:spPr>
+        <p:style>
+          <a:lnRef idx="1">
+            <a:schemeClr val="accent6"/>
+          </a:lnRef>
+          <a:fillRef idx="0">
+            <a:schemeClr val="accent6"/>
+          </a:fillRef>
+          <a:effectRef idx="0">
+            <a:schemeClr val="accent6"/>
+          </a:effectRef>
+          <a:fontRef idx="minor">
+            <a:schemeClr val="tx1"/>
+          </a:fontRef>
+        </p:style>
+      </p:cxnSp>
+    </p:spTree>
+    <p:extLst>
+      <p:ext uri="{BB962C8B-B14F-4D97-AF65-F5344CB8AC3E}">
+        <p14:creationId xmlns:p14="http://schemas.microsoft.com/office/powerpoint/2010/main" val="230691859"/>
       </p:ext>
     </p:extLst>
   </p:cSld>
@@ -4154,4 +5149,299 @@
     </a:ext>
   </a:extLst>
 </a:theme>
+</file>
+
+<file path=ppt/theme/theme2.xml><?xml version="1.0" encoding="utf-8"?>
+<a:theme xmlns:a="http://schemas.openxmlformats.org/drawingml/2006/main" name="Office">
+  <a:themeElements>
+    <a:clrScheme name="Office">
+      <a:dk1>
+        <a:sysClr val="windowText" lastClr="000000"/>
+      </a:dk1>
+      <a:lt1>
+        <a:sysClr val="window" lastClr="FFFFFF"/>
+      </a:lt1>
+      <a:dk2>
+        <a:srgbClr val="44546A"/>
+      </a:dk2>
+      <a:lt2>
+        <a:srgbClr val="E7E6E6"/>
+      </a:lt2>
+      <a:accent1>
+        <a:srgbClr val="4472C4"/>
+      </a:accent1>
+      <a:accent2>
+        <a:srgbClr val="ED7D31"/>
+      </a:accent2>
+      <a:accent3>
+        <a:srgbClr val="A5A5A5"/>
+      </a:accent3>
+      <a:accent4>
+        <a:srgbClr val="FFC000"/>
+      </a:accent4>
+      <a:accent5>
+        <a:srgbClr val="5B9BD5"/>
+      </a:accent5>
+      <a:accent6>
+        <a:srgbClr val="70AD47"/>
+      </a:accent6>
+      <a:hlink>
+        <a:srgbClr val="0563C1"/>
+      </a:hlink>
+      <a:folHlink>
+        <a:srgbClr val="954F72"/>
+      </a:folHlink>
+    </a:clrScheme>
+    <a:fontScheme name="Office">
+      <a:majorFont>
+        <a:latin typeface="Calibri Light" panose="020F0302020204030204"/>
+        <a:ea typeface=""/>
+        <a:cs typeface=""/>
+        <a:font script="Jpan" typeface="游ゴシック Light"/>
+        <a:font script="Hang" typeface="맑은 고딕"/>
+        <a:font script="Hans" typeface="等线 Light"/>
+        <a:font script="Hant" typeface="新細明體"/>
+        <a:font script="Arab" typeface="Times New Roman"/>
+        <a:font script="Hebr" typeface="Times New Roman"/>
+        <a:font script="Thai" typeface="Angsana New"/>
+        <a:font script="Ethi" typeface="Nyala"/>
+        <a:font script="Beng" typeface="Vrinda"/>
+        <a:font script="Gujr" typeface="Shruti"/>
+        <a:font script="Khmr" typeface="MoolBoran"/>
+        <a:font script="Knda" typeface="Tunga"/>
+        <a:font script="Guru" typeface="Raavi"/>
+        <a:font script="Cans" typeface="Euphemia"/>
+        <a:font script="Cher" typeface="Plantagenet Cherokee"/>
+        <a:font script="Yiii" typeface="Microsoft Yi Baiti"/>
+        <a:font script="Tibt" typeface="Microsoft Himalaya"/>
+        <a:font script="Thaa" typeface="MV Boli"/>
+        <a:font script="Deva" typeface="Mangal"/>
+        <a:font script="Telu" typeface="Gautami"/>
+        <a:font script="Taml" typeface="Latha"/>
+        <a:font script="Syrc" typeface="Estrangelo Edessa"/>
+        <a:font script="Orya" typeface="Kalinga"/>
+        <a:font script="Mlym" typeface="Kartika"/>
+        <a:font script="Laoo" typeface="DokChampa"/>
+        <a:font script="Sinh" typeface="Iskoola Pota"/>
+        <a:font script="Mong" typeface="Mongolian Baiti"/>
+        <a:font script="Viet" typeface="Times New Roman"/>
+        <a:font script="Uigh" typeface="Microsoft Uighur"/>
+        <a:font script="Geor" typeface="Sylfaen"/>
+        <a:font script="Armn" typeface="Arial"/>
+        <a:font script="Bugi" typeface="Leelawadee UI"/>
+        <a:font script="Bopo" typeface="Microsoft JhengHei"/>
+        <a:font script="Java" typeface="Javanese Text"/>
+        <a:font script="Lisu" typeface="Segoe UI"/>
+        <a:font script="Mymr" typeface="Myanmar Text"/>
+        <a:font script="Nkoo" typeface="Ebrima"/>
+        <a:font script="Olck" typeface="Nirmala UI"/>
+        <a:font script="Osma" typeface="Ebrima"/>
+        <a:font script="Phag" typeface="Phagspa"/>
+        <a:font script="Syrn" typeface="Estrangelo Edessa"/>
+        <a:font script="Syrj" typeface="Estrangelo Edessa"/>
+        <a:font script="Syre" typeface="Estrangelo Edessa"/>
+        <a:font script="Sora" typeface="Nirmala UI"/>
+        <a:font script="Tale" typeface="Microsoft Tai Le"/>
+        <a:font script="Talu" typeface="Microsoft New Tai Lue"/>
+        <a:font script="Tfng" typeface="Ebrima"/>
+      </a:majorFont>
+      <a:minorFont>
+        <a:latin typeface="Calibri" panose="020F0502020204030204"/>
+        <a:ea typeface=""/>
+        <a:cs typeface=""/>
+        <a:font script="Jpan" typeface="游ゴシック"/>
+        <a:font script="Hang" typeface="맑은 고딕"/>
+        <a:font script="Hans" typeface="等线"/>
+        <a:font script="Hant" typeface="新細明體"/>
+        <a:font script="Arab" typeface="Arial"/>
+        <a:font script="Hebr" typeface="Arial"/>
+        <a:font script="Thai" typeface="Cordia New"/>
+        <a:font script="Ethi" typeface="Nyala"/>
+        <a:font script="Beng" typeface="Vrinda"/>
+        <a:font script="Gujr" typeface="Shruti"/>
+        <a:font script="Khmr" typeface="DaunPenh"/>
+        <a:font script="Knda" typeface="Tunga"/>
+        <a:font script="Guru" typeface="Raavi"/>
+        <a:font script="Cans" typeface="Euphemia"/>
+        <a:font script="Cher" typeface="Plantagenet Cherokee"/>
+        <a:font script="Yiii" typeface="Microsoft Yi Baiti"/>
+        <a:font script="Tibt" typeface="Microsoft Himalaya"/>
+        <a:font script="Thaa" typeface="MV Boli"/>
+        <a:font script="Deva" typeface="Mangal"/>
+        <a:font script="Telu" typeface="Gautami"/>
+        <a:font script="Taml" typeface="Latha"/>
+        <a:font script="Syrc" typeface="Estrangelo Edessa"/>
+        <a:font script="Orya" typeface="Kalinga"/>
+        <a:font script="Mlym" typeface="Kartika"/>
+        <a:font script="Laoo" typeface="DokChampa"/>
+        <a:font script="Sinh" typeface="Iskoola Pota"/>
+        <a:font script="Mong" typeface="Mongolian Baiti"/>
+        <a:font script="Viet" typeface="Arial"/>
+        <a:font script="Uigh" typeface="Microsoft Uighur"/>
+        <a:font script="Geor" typeface="Sylfaen"/>
+        <a:font script="Armn" typeface="Arial"/>
+        <a:font script="Bugi" typeface="Leelawadee UI"/>
+        <a:font script="Bopo" typeface="Microsoft JhengHei"/>
+        <a:font script="Java" typeface="Javanese Text"/>
+        <a:font script="Lisu" typeface="Segoe UI"/>
+        <a:font script="Mymr" typeface="Myanmar Text"/>
+        <a:font script="Nkoo" typeface="Ebrima"/>
+        <a:font script="Olck" typeface="Nirmala UI"/>
+        <a:font script="Osma" typeface="Ebrima"/>
+        <a:font script="Phag" typeface="Phagspa"/>
+        <a:font script="Syrn" typeface="Estrangelo Edessa"/>
+        <a:font script="Syrj" typeface="Estrangelo Edessa"/>
+        <a:font script="Syre" typeface="Estrangelo Edessa"/>
+        <a:font script="Sora" typeface="Nirmala UI"/>
+        <a:font script="Tale" typeface="Microsoft Tai Le"/>
+        <a:font script="Talu" typeface="Microsoft New Tai Lue"/>
+        <a:font script="Tfng" typeface="Ebrima"/>
+      </a:minorFont>
+    </a:fontScheme>
+    <a:fmtScheme name="Office">
+      <a:fillStyleLst>
+        <a:solidFill>
+          <a:schemeClr val="phClr"/>
+        </a:solidFill>
+        <a:gradFill rotWithShape="1">
+          <a:gsLst>
+            <a:gs pos="0">
+              <a:schemeClr val="phClr">
+                <a:lumMod val="110000"/>
+                <a:satMod val="105000"/>
+                <a:tint val="67000"/>
+              </a:schemeClr>
+            </a:gs>
+            <a:gs pos="50000">
+              <a:schemeClr val="phClr">
+                <a:lumMod val="105000"/>
+                <a:satMod val="103000"/>
+                <a:tint val="73000"/>
+              </a:schemeClr>
+            </a:gs>
+            <a:gs pos="100000">
+              <a:schemeClr val="phClr">
+                <a:lumMod val="105000"/>
+                <a:satMod val="109000"/>
+                <a:tint val="81000"/>
+              </a:schemeClr>
+            </a:gs>
+          </a:gsLst>
+          <a:lin ang="5400000" scaled="0"/>
+        </a:gradFill>
+        <a:gradFill rotWithShape="1">
+          <a:gsLst>
+            <a:gs pos="0">
+              <a:schemeClr val="phClr">
+                <a:satMod val="103000"/>
+                <a:lumMod val="102000"/>
+                <a:tint val="94000"/>
+              </a:schemeClr>
+            </a:gs>
+            <a:gs pos="50000">
+              <a:schemeClr val="phClr">
+                <a:satMod val="110000"/>
+                <a:lumMod val="100000"/>
+                <a:shade val="100000"/>
+              </a:schemeClr>
+            </a:gs>
+            <a:gs pos="100000">
+              <a:schemeClr val="phClr">
+                <a:lumMod val="99000"/>
+                <a:satMod val="120000"/>
+                <a:shade val="78000"/>
+              </a:schemeClr>
+            </a:gs>
+          </a:gsLst>
+          <a:lin ang="5400000" scaled="0"/>
+        </a:gradFill>
+      </a:fillStyleLst>
+      <a:lnStyleLst>
+        <a:ln w="6350" cap="flat" cmpd="sng" algn="ctr">
+          <a:solidFill>
+            <a:schemeClr val="phClr"/>
+          </a:solidFill>
+          <a:prstDash val="solid"/>
+          <a:miter lim="800000"/>
+        </a:ln>
+        <a:ln w="12700" cap="flat" cmpd="sng" algn="ctr">
+          <a:solidFill>
+            <a:schemeClr val="phClr"/>
+          </a:solidFill>
+          <a:prstDash val="solid"/>
+          <a:miter lim="800000"/>
+        </a:ln>
+        <a:ln w="19050" cap="flat" cmpd="sng" algn="ctr">
+          <a:solidFill>
+            <a:schemeClr val="phClr"/>
+          </a:solidFill>
+          <a:prstDash val="solid"/>
+          <a:miter lim="800000"/>
+        </a:ln>
+      </a:lnStyleLst>
+      <a:effectStyleLst>
+        <a:effectStyle>
+          <a:effectLst/>
+        </a:effectStyle>
+        <a:effectStyle>
+          <a:effectLst/>
+        </a:effectStyle>
+        <a:effectStyle>
+          <a:effectLst>
+            <a:outerShdw blurRad="57150" dist="19050" dir="5400000" algn="ctr" rotWithShape="0">
+              <a:srgbClr val="000000">
+                <a:alpha val="63000"/>
+              </a:srgbClr>
+            </a:outerShdw>
+          </a:effectLst>
+        </a:effectStyle>
+      </a:effectStyleLst>
+      <a:bgFillStyleLst>
+        <a:solidFill>
+          <a:schemeClr val="phClr"/>
+        </a:solidFill>
+        <a:solidFill>
+          <a:schemeClr val="phClr">
+            <a:tint val="95000"/>
+            <a:satMod val="170000"/>
+          </a:schemeClr>
+        </a:solidFill>
+        <a:gradFill rotWithShape="1">
+          <a:gsLst>
+            <a:gs pos="0">
+              <a:schemeClr val="phClr">
+                <a:tint val="93000"/>
+                <a:satMod val="150000"/>
+                <a:shade val="98000"/>
+                <a:lumMod val="102000"/>
+              </a:schemeClr>
+            </a:gs>
+            <a:gs pos="50000">
+              <a:schemeClr val="phClr">
+                <a:tint val="98000"/>
+                <a:satMod val="130000"/>
+                <a:shade val="90000"/>
+                <a:lumMod val="103000"/>
+              </a:schemeClr>
+            </a:gs>
+            <a:gs pos="100000">
+              <a:schemeClr val="phClr">
+                <a:shade val="63000"/>
+                <a:satMod val="120000"/>
+              </a:schemeClr>
+            </a:gs>
+          </a:gsLst>
+          <a:lin ang="5400000" scaled="0"/>
+        </a:gradFill>
+      </a:bgFillStyleLst>
+    </a:fmtScheme>
+  </a:themeElements>
+  <a:objectDefaults/>
+  <a:extraClrSchemeLst/>
+  <a:extLst>
+    <a:ext uri="{05A4C25C-085E-4340-85A3-A5531E510DB2}">
+      <thm15:themeFamily xmlns:thm15="http://schemas.microsoft.com/office/thememl/2012/main" name="Office Theme" id="{62F939B6-93AF-4DB8-9C6B-D6C7DFDC589F}" vid="{4A3C46E8-61CC-4603-A589-7422A47A8E4A}"/>
+    </a:ext>
+  </a:extLst>
+</a:theme>
 </file>
</xml_diff>